<commit_message>
Add test script for all-MiniLM-L6-v2 semantic embeddings
- Created a new test script `test_embeddings.py` to validate the functionality of the all-MiniLM-L6-v2 model.
- Implemented test cases for semantic search on contract-related chunks, including termination rights, liability limitations, and payment terms.
- Verified the embedding model and indexed chunks, ensuring correct output for each query.
</commit_message>
<xml_diff>
--- a/Contract RAG Prototype.pptx
+++ b/Contract RAG Prototype.pptx
@@ -7,15 +7,14 @@
   <p:sldIdLst>
     <p:sldId id="256" r:id="rId2"/>
     <p:sldId id="257" r:id="rId3"/>
-    <p:sldId id="258" r:id="rId4"/>
-    <p:sldId id="259" r:id="rId5"/>
-    <p:sldId id="261" r:id="rId6"/>
-    <p:sldId id="260" r:id="rId7"/>
-    <p:sldId id="262" r:id="rId8"/>
-    <p:sldId id="265" r:id="rId9"/>
-    <p:sldId id="264" r:id="rId10"/>
-    <p:sldId id="263" r:id="rId11"/>
-    <p:sldId id="266" r:id="rId12"/>
+    <p:sldId id="259" r:id="rId4"/>
+    <p:sldId id="261" r:id="rId5"/>
+    <p:sldId id="260" r:id="rId6"/>
+    <p:sldId id="262" r:id="rId7"/>
+    <p:sldId id="265" r:id="rId8"/>
+    <p:sldId id="264" r:id="rId9"/>
+    <p:sldId id="263" r:id="rId10"/>
+    <p:sldId id="266" r:id="rId11"/>
   </p:sldIdLst>
   <p:sldSz cx="12192000" cy="6858000"/>
   <p:notesSz cx="6858000" cy="9144000"/>
@@ -114,6 +113,11 @@
       </a:defRPr>
     </a:lvl9pPr>
   </p:defaultTextStyle>
+  <p:extLst>
+    <p:ext uri="{EFAFB233-063F-42B5-8137-9DF3F51BA10A}">
+      <p15:sldGuideLst xmlns:p15="http://schemas.microsoft.com/office/powerpoint/2012/main"/>
+    </p:ext>
+  </p:extLst>
 </p:presentation>
 </file>
 
@@ -7692,634 +7696,6 @@
       </p:grpSpPr>
       <p:sp>
         <p:nvSpPr>
-          <p:cNvPr id="3" name="Title 1">
-            <a:extLst>
-              <a:ext uri="{FF2B5EF4-FFF2-40B4-BE49-F238E27FC236}">
-                <a16:creationId xmlns:a16="http://schemas.microsoft.com/office/drawing/2014/main" id="{76AD70EA-FF3A-6043-507B-5C16D4837DAD}"/>
-              </a:ext>
-            </a:extLst>
-          </p:cNvPr>
-          <p:cNvSpPr txBox="1">
-            <a:spLocks/>
-          </p:cNvSpPr>
-          <p:nvPr/>
-        </p:nvSpPr>
-        <p:spPr>
-          <a:xfrm>
-            <a:off x="1307955" y="176991"/>
-            <a:ext cx="8929815" cy="2035628"/>
-          </a:xfrm>
-          <a:prstGeom prst="rect">
-            <a:avLst/>
-          </a:prstGeom>
-        </p:spPr>
-        <p:txBody>
-          <a:bodyPr vert="horz" lIns="91440" tIns="45720" rIns="91440" bIns="45720" rtlCol="0" anchor="t">
-            <a:normAutofit/>
-          </a:bodyPr>
-          <a:lstStyle>
-            <a:lvl1pPr algn="l" defTabSz="914400" rtl="0" eaLnBrk="1" latinLnBrk="0" hangingPunct="1">
-              <a:lnSpc>
-                <a:spcPct val="89000"/>
-              </a:lnSpc>
-              <a:spcBef>
-                <a:spcPct val="0"/>
-              </a:spcBef>
-              <a:buNone/>
-              <a:defRPr sz="4400" kern="1200" baseline="0">
-                <a:solidFill>
-                  <a:schemeClr val="tx2"/>
-                </a:solidFill>
-                <a:latin typeface="+mj-lt"/>
-                <a:ea typeface="+mj-ea"/>
-                <a:cs typeface="+mj-cs"/>
-              </a:defRPr>
-            </a:lvl1pPr>
-          </a:lstStyle>
-          <a:p>
-            <a:r>
-              <a:rPr lang="en-IN" b="1" dirty="0"/>
-              <a:t>Embeddings Strategy</a:t>
-            </a:r>
-          </a:p>
-        </p:txBody>
-      </p:sp>
-      <p:sp>
-        <p:nvSpPr>
-          <p:cNvPr id="5" name="TextBox 4">
-            <a:extLst>
-              <a:ext uri="{FF2B5EF4-FFF2-40B4-BE49-F238E27FC236}">
-                <a16:creationId xmlns:a16="http://schemas.microsoft.com/office/drawing/2014/main" id="{CA5CAA1B-1E4E-9D3C-D697-B2DBF34247B9}"/>
-              </a:ext>
-            </a:extLst>
-          </p:cNvPr>
-          <p:cNvSpPr txBox="1"/>
-          <p:nvPr/>
-        </p:nvSpPr>
-        <p:spPr>
-          <a:xfrm>
-            <a:off x="946894" y="1194805"/>
-            <a:ext cx="5526477" cy="5262979"/>
-          </a:xfrm>
-          <a:prstGeom prst="rect">
-            <a:avLst/>
-          </a:prstGeom>
-          <a:noFill/>
-        </p:spPr>
-        <p:txBody>
-          <a:bodyPr wrap="square">
-            <a:spAutoFit/>
-          </a:bodyPr>
-          <a:lstStyle/>
-          <a:p>
-            <a:r>
-              <a:rPr lang="en-IN" sz="1400" b="1" dirty="0">
-                <a:latin typeface="Times New Roman" panose="02020603050405020304" pitchFamily="18" charset="0"/>
-                <a:cs typeface="Times New Roman" panose="02020603050405020304" pitchFamily="18" charset="0"/>
-              </a:rPr>
-              <a:t>Decision: Sentence-BERT (all-MiniLM-L6-v2) + BM25</a:t>
-            </a:r>
-          </a:p>
-          <a:p>
-            <a:endParaRPr lang="en-IN" sz="1400" b="1" dirty="0">
-              <a:latin typeface="Times New Roman" panose="02020603050405020304" pitchFamily="18" charset="0"/>
-              <a:cs typeface="Times New Roman" panose="02020603050405020304" pitchFamily="18" charset="0"/>
-            </a:endParaRPr>
-          </a:p>
-          <a:p>
-            <a:pPr lvl="1"/>
-            <a:r>
-              <a:rPr lang="en-IN" sz="1400" b="1" dirty="0">
-                <a:latin typeface="Times New Roman" panose="02020603050405020304" pitchFamily="18" charset="0"/>
-                <a:cs typeface="Times New Roman" panose="02020603050405020304" pitchFamily="18" charset="0"/>
-              </a:rPr>
-              <a:t>Selected Model</a:t>
-            </a:r>
-            <a:r>
-              <a:rPr lang="en-IN" sz="1400" dirty="0">
-                <a:latin typeface="Times New Roman" panose="02020603050405020304" pitchFamily="18" charset="0"/>
-                <a:cs typeface="Times New Roman" panose="02020603050405020304" pitchFamily="18" charset="0"/>
-              </a:rPr>
-              <a:t>: sentence-transformers/all-MiniLM-L6-v2</a:t>
-            </a:r>
-          </a:p>
-          <a:p>
-            <a:pPr lvl="1"/>
-            <a:r>
-              <a:rPr lang="en-IN" sz="1400" b="1" dirty="0">
-                <a:latin typeface="Times New Roman" panose="02020603050405020304" pitchFamily="18" charset="0"/>
-                <a:cs typeface="Times New Roman" panose="02020603050405020304" pitchFamily="18" charset="0"/>
-              </a:rPr>
-              <a:t>Characteristics</a:t>
-            </a:r>
-            <a:r>
-              <a:rPr lang="en-IN" sz="1400" dirty="0">
-                <a:latin typeface="Times New Roman" panose="02020603050405020304" pitchFamily="18" charset="0"/>
-                <a:cs typeface="Times New Roman" panose="02020603050405020304" pitchFamily="18" charset="0"/>
-              </a:rPr>
-              <a:t>:</a:t>
-            </a:r>
-          </a:p>
-          <a:p>
-            <a:pPr marL="742950" lvl="1" indent="-285750">
-              <a:buFont typeface="Arial" panose="020B0604020202020204" pitchFamily="34" charset="0"/>
-              <a:buChar char="•"/>
-            </a:pPr>
-            <a:r>
-              <a:rPr lang="en-IN" sz="1400" b="1" dirty="0">
-                <a:latin typeface="Times New Roman" panose="02020603050405020304" pitchFamily="18" charset="0"/>
-                <a:cs typeface="Times New Roman" panose="02020603050405020304" pitchFamily="18" charset="0"/>
-              </a:rPr>
-              <a:t>Architecture</a:t>
-            </a:r>
-            <a:r>
-              <a:rPr lang="en-IN" sz="1400" dirty="0">
-                <a:latin typeface="Times New Roman" panose="02020603050405020304" pitchFamily="18" charset="0"/>
-                <a:cs typeface="Times New Roman" panose="02020603050405020304" pitchFamily="18" charset="0"/>
-              </a:rPr>
-              <a:t>: </a:t>
-            </a:r>
-            <a:r>
-              <a:rPr lang="en-IN" sz="1400" dirty="0" err="1">
-                <a:latin typeface="Times New Roman" panose="02020603050405020304" pitchFamily="18" charset="0"/>
-                <a:cs typeface="Times New Roman" panose="02020603050405020304" pitchFamily="18" charset="0"/>
-              </a:rPr>
-              <a:t>DistilBERT</a:t>
-            </a:r>
-            <a:r>
-              <a:rPr lang="en-IN" sz="1400" dirty="0">
-                <a:latin typeface="Times New Roman" panose="02020603050405020304" pitchFamily="18" charset="0"/>
-                <a:cs typeface="Times New Roman" panose="02020603050405020304" pitchFamily="18" charset="0"/>
-              </a:rPr>
-              <a:t>-based sentence embeddings</a:t>
-            </a:r>
-          </a:p>
-          <a:p>
-            <a:pPr marL="742950" lvl="1" indent="-285750">
-              <a:buFont typeface="Arial" panose="020B0604020202020204" pitchFamily="34" charset="0"/>
-              <a:buChar char="•"/>
-            </a:pPr>
-            <a:r>
-              <a:rPr lang="en-IN" sz="1400" b="1" dirty="0">
-                <a:latin typeface="Times New Roman" panose="02020603050405020304" pitchFamily="18" charset="0"/>
-                <a:cs typeface="Times New Roman" panose="02020603050405020304" pitchFamily="18" charset="0"/>
-              </a:rPr>
-              <a:t>Dimension</a:t>
-            </a:r>
-            <a:r>
-              <a:rPr lang="en-IN" sz="1400" dirty="0">
-                <a:latin typeface="Times New Roman" panose="02020603050405020304" pitchFamily="18" charset="0"/>
-                <a:cs typeface="Times New Roman" panose="02020603050405020304" pitchFamily="18" charset="0"/>
-              </a:rPr>
-              <a:t>: 384 (vs. 768 for full BERT, 1536 for OpenAI)</a:t>
-            </a:r>
-          </a:p>
-          <a:p>
-            <a:pPr marL="742950" lvl="1" indent="-285750">
-              <a:buFont typeface="Arial" panose="020B0604020202020204" pitchFamily="34" charset="0"/>
-              <a:buChar char="•"/>
-            </a:pPr>
-            <a:r>
-              <a:rPr lang="en-IN" sz="1400" b="1" dirty="0">
-                <a:latin typeface="Times New Roman" panose="02020603050405020304" pitchFamily="18" charset="0"/>
-                <a:cs typeface="Times New Roman" panose="02020603050405020304" pitchFamily="18" charset="0"/>
-              </a:rPr>
-              <a:t>Parameters</a:t>
-            </a:r>
-            <a:r>
-              <a:rPr lang="en-IN" sz="1400" dirty="0">
-                <a:latin typeface="Times New Roman" panose="02020603050405020304" pitchFamily="18" charset="0"/>
-                <a:cs typeface="Times New Roman" panose="02020603050405020304" pitchFamily="18" charset="0"/>
-              </a:rPr>
-              <a:t>: 22M (lightweight, &lt;200MB memory)</a:t>
-            </a:r>
-          </a:p>
-          <a:p>
-            <a:pPr lvl="1"/>
-            <a:r>
-              <a:rPr lang="en-IN" sz="1400" b="1" dirty="0">
-                <a:latin typeface="Times New Roman" panose="02020603050405020304" pitchFamily="18" charset="0"/>
-                <a:cs typeface="Times New Roman" panose="02020603050405020304" pitchFamily="18" charset="0"/>
-              </a:rPr>
-              <a:t>Why This Choice</a:t>
-            </a:r>
-            <a:r>
-              <a:rPr lang="en-IN" sz="1400" dirty="0">
-                <a:latin typeface="Times New Roman" panose="02020603050405020304" pitchFamily="18" charset="0"/>
-                <a:cs typeface="Times New Roman" panose="02020603050405020304" pitchFamily="18" charset="0"/>
-              </a:rPr>
-              <a:t>:</a:t>
-            </a:r>
-          </a:p>
-          <a:p>
-            <a:pPr lvl="1">
-              <a:buFont typeface="+mj-lt"/>
-              <a:buAutoNum type="arabicPeriod"/>
-            </a:pPr>
-            <a:r>
-              <a:rPr lang="en-IN" sz="1400" b="1" dirty="0">
-                <a:latin typeface="Times New Roman" panose="02020603050405020304" pitchFamily="18" charset="0"/>
-                <a:cs typeface="Times New Roman" panose="02020603050405020304" pitchFamily="18" charset="0"/>
-              </a:rPr>
-              <a:t>Legal Domain Applicability</a:t>
-            </a:r>
-            <a:r>
-              <a:rPr lang="en-IN" sz="1400" dirty="0">
-                <a:latin typeface="Times New Roman" panose="02020603050405020304" pitchFamily="18" charset="0"/>
-                <a:cs typeface="Times New Roman" panose="02020603050405020304" pitchFamily="18" charset="0"/>
-              </a:rPr>
-              <a:t>:</a:t>
-            </a:r>
-          </a:p>
-          <a:p>
-            <a:pPr marL="1200150" lvl="2" indent="-285750">
-              <a:buFont typeface="+mj-lt"/>
-              <a:buAutoNum type="arabicPeriod"/>
-            </a:pPr>
-            <a:r>
-              <a:rPr lang="en-IN" sz="1400" dirty="0">
-                <a:latin typeface="Times New Roman" panose="02020603050405020304" pitchFamily="18" charset="0"/>
-                <a:cs typeface="Times New Roman" panose="02020603050405020304" pitchFamily="18" charset="0"/>
-              </a:rPr>
-              <a:t>Trained on diverse corpora (including legal-adjacent datasets)</a:t>
-            </a:r>
-          </a:p>
-          <a:p>
-            <a:pPr marL="1200150" lvl="2" indent="-285750">
-              <a:buFont typeface="+mj-lt"/>
-              <a:buAutoNum type="arabicPeriod"/>
-            </a:pPr>
-            <a:r>
-              <a:rPr lang="en-IN" sz="1400" dirty="0">
-                <a:latin typeface="Times New Roman" panose="02020603050405020304" pitchFamily="18" charset="0"/>
-                <a:cs typeface="Times New Roman" panose="02020603050405020304" pitchFamily="18" charset="0"/>
-              </a:rPr>
-              <a:t>Captures semantic similarity for contract language</a:t>
-            </a:r>
-          </a:p>
-          <a:p>
-            <a:pPr marL="1200150" lvl="2" indent="-285750">
-              <a:buFont typeface="+mj-lt"/>
-              <a:buAutoNum type="arabicPeriod"/>
-            </a:pPr>
-            <a:r>
-              <a:rPr lang="en-IN" sz="1400" dirty="0">
-                <a:latin typeface="Times New Roman" panose="02020603050405020304" pitchFamily="18" charset="0"/>
-                <a:cs typeface="Times New Roman" panose="02020603050405020304" pitchFamily="18" charset="0"/>
-              </a:rPr>
-              <a:t>Example: "termination by either party" ≈ "right to terminate" (high cosine similarity)</a:t>
-            </a:r>
-          </a:p>
-          <a:p>
-            <a:pPr lvl="1">
-              <a:buFont typeface="+mj-lt"/>
-              <a:buAutoNum type="arabicPeriod"/>
-            </a:pPr>
-            <a:r>
-              <a:rPr lang="en-IN" sz="1400" b="1" dirty="0">
-                <a:latin typeface="Times New Roman" panose="02020603050405020304" pitchFamily="18" charset="0"/>
-                <a:cs typeface="Times New Roman" panose="02020603050405020304" pitchFamily="18" charset="0"/>
-              </a:rPr>
-              <a:t>Efficiency for Lightweight Deployment</a:t>
-            </a:r>
-            <a:r>
-              <a:rPr lang="en-IN" sz="1400" dirty="0">
-                <a:latin typeface="Times New Roman" panose="02020603050405020304" pitchFamily="18" charset="0"/>
-                <a:cs typeface="Times New Roman" panose="02020603050405020304" pitchFamily="18" charset="0"/>
-              </a:rPr>
-              <a:t>:</a:t>
-            </a:r>
-          </a:p>
-          <a:p>
-            <a:pPr marL="1200150" lvl="2" indent="-285750">
-              <a:buFont typeface="+mj-lt"/>
-              <a:buAutoNum type="arabicPeriod"/>
-            </a:pPr>
-            <a:r>
-              <a:rPr lang="en-IN" sz="1400" dirty="0">
-                <a:latin typeface="Times New Roman" panose="02020603050405020304" pitchFamily="18" charset="0"/>
-                <a:cs typeface="Times New Roman" panose="02020603050405020304" pitchFamily="18" charset="0"/>
-              </a:rPr>
-              <a:t>384-dim embeddings → fast cosine similarity computation</a:t>
-            </a:r>
-          </a:p>
-          <a:p>
-            <a:pPr marL="1200150" lvl="2" indent="-285750">
-              <a:buFont typeface="+mj-lt"/>
-              <a:buAutoNum type="arabicPeriod"/>
-            </a:pPr>
-            <a:r>
-              <a:rPr lang="en-IN" sz="1400" dirty="0">
-                <a:latin typeface="Times New Roman" panose="02020603050405020304" pitchFamily="18" charset="0"/>
-                <a:cs typeface="Times New Roman" panose="02020603050405020304" pitchFamily="18" charset="0"/>
-              </a:rPr>
-              <a:t>Batch processing: 1000 chunks in &lt;2 seconds</a:t>
-            </a:r>
-          </a:p>
-          <a:p>
-            <a:pPr marL="1200150" lvl="2" indent="-285750">
-              <a:buFont typeface="+mj-lt"/>
-              <a:buAutoNum type="arabicPeriod"/>
-            </a:pPr>
-            <a:r>
-              <a:rPr lang="en-IN" sz="1400" dirty="0">
-                <a:latin typeface="Times New Roman" panose="02020603050405020304" pitchFamily="18" charset="0"/>
-                <a:cs typeface="Times New Roman" panose="02020603050405020304" pitchFamily="18" charset="0"/>
-              </a:rPr>
-              <a:t>Memory efficient: 250 chunks × 384 floats = ~390KB</a:t>
-            </a:r>
-          </a:p>
-          <a:p>
-            <a:pPr lvl="1">
-              <a:buFont typeface="+mj-lt"/>
-              <a:buAutoNum type="arabicPeriod"/>
-            </a:pPr>
-            <a:r>
-              <a:rPr lang="en-IN" sz="1400" b="1" dirty="0">
-                <a:latin typeface="Times New Roman" panose="02020603050405020304" pitchFamily="18" charset="0"/>
-                <a:cs typeface="Times New Roman" panose="02020603050405020304" pitchFamily="18" charset="0"/>
-              </a:rPr>
-              <a:t>Hybrid Complementarity</a:t>
-            </a:r>
-            <a:r>
-              <a:rPr lang="en-IN" sz="1400" dirty="0">
-                <a:latin typeface="Times New Roman" panose="02020603050405020304" pitchFamily="18" charset="0"/>
-                <a:cs typeface="Times New Roman" panose="02020603050405020304" pitchFamily="18" charset="0"/>
-              </a:rPr>
-              <a:t>:</a:t>
-            </a:r>
-          </a:p>
-          <a:p>
-            <a:pPr marL="1200150" lvl="2" indent="-285750">
-              <a:buFont typeface="+mj-lt"/>
-              <a:buAutoNum type="arabicPeriod"/>
-            </a:pPr>
-            <a:r>
-              <a:rPr lang="en-IN" sz="1400" dirty="0">
-                <a:latin typeface="Times New Roman" panose="02020603050405020304" pitchFamily="18" charset="0"/>
-                <a:cs typeface="Times New Roman" panose="02020603050405020304" pitchFamily="18" charset="0"/>
-              </a:rPr>
-              <a:t>Semantic (vector) captures meaning</a:t>
-            </a:r>
-          </a:p>
-          <a:p>
-            <a:pPr marL="1200150" lvl="2" indent="-285750">
-              <a:buFont typeface="+mj-lt"/>
-              <a:buAutoNum type="arabicPeriod"/>
-            </a:pPr>
-            <a:r>
-              <a:rPr lang="en-IN" sz="1400" dirty="0">
-                <a:latin typeface="Times New Roman" panose="02020603050405020304" pitchFamily="18" charset="0"/>
-                <a:cs typeface="Times New Roman" panose="02020603050405020304" pitchFamily="18" charset="0"/>
-              </a:rPr>
-              <a:t>BM25 captures exact terminology matches</a:t>
-            </a:r>
-          </a:p>
-          <a:p>
-            <a:pPr marL="1200150" lvl="2" indent="-285750">
-              <a:buFont typeface="+mj-lt"/>
-              <a:buAutoNum type="arabicPeriod"/>
-            </a:pPr>
-            <a:r>
-              <a:rPr lang="en-IN" sz="1400" dirty="0">
-                <a:latin typeface="Times New Roman" panose="02020603050405020304" pitchFamily="18" charset="0"/>
-                <a:cs typeface="Times New Roman" panose="02020603050405020304" pitchFamily="18" charset="0"/>
-              </a:rPr>
-              <a:t>Combined: "liability" + semantic meaning → strong recall</a:t>
-            </a:r>
-          </a:p>
-        </p:txBody>
-      </p:sp>
-      <p:sp>
-        <p:nvSpPr>
-          <p:cNvPr id="7" name="TextBox 6">
-            <a:extLst>
-              <a:ext uri="{FF2B5EF4-FFF2-40B4-BE49-F238E27FC236}">
-                <a16:creationId xmlns:a16="http://schemas.microsoft.com/office/drawing/2014/main" id="{32C000B9-00EF-DE73-1E73-D48501A311C6}"/>
-              </a:ext>
-            </a:extLst>
-          </p:cNvPr>
-          <p:cNvSpPr txBox="1"/>
-          <p:nvPr/>
-        </p:nvSpPr>
-        <p:spPr>
-          <a:xfrm>
-            <a:off x="6834432" y="1427033"/>
-            <a:ext cx="5009211" cy="2677656"/>
-          </a:xfrm>
-          <a:prstGeom prst="rect">
-            <a:avLst/>
-          </a:prstGeom>
-          <a:noFill/>
-        </p:spPr>
-        <p:txBody>
-          <a:bodyPr wrap="square">
-            <a:spAutoFit/>
-          </a:bodyPr>
-          <a:lstStyle/>
-          <a:p>
-            <a:pPr>
-              <a:buNone/>
-            </a:pPr>
-            <a:r>
-              <a:rPr lang="en-IN" sz="1400" b="1" dirty="0">
-                <a:latin typeface="Times New Roman" panose="02020603050405020304" pitchFamily="18" charset="0"/>
-                <a:cs typeface="Times New Roman" panose="02020603050405020304" pitchFamily="18" charset="0"/>
-              </a:rPr>
-              <a:t>Alternative Considered: OpenAI Embeddings (text-embedding-3-small)</a:t>
-            </a:r>
-          </a:p>
-          <a:p>
-            <a:pPr marL="171450" indent="-171450">
-              <a:buFont typeface="Arial" panose="020B0604020202020204" pitchFamily="34" charset="0"/>
-              <a:buChar char="•"/>
-            </a:pPr>
-            <a:r>
-              <a:rPr lang="en-IN" sz="1400" b="1" dirty="0">
-                <a:latin typeface="Times New Roman" panose="02020603050405020304" pitchFamily="18" charset="0"/>
-                <a:cs typeface="Times New Roman" panose="02020603050405020304" pitchFamily="18" charset="0"/>
-              </a:rPr>
-              <a:t>Pros</a:t>
-            </a:r>
-            <a:r>
-              <a:rPr lang="en-IN" sz="1400" dirty="0">
-                <a:latin typeface="Times New Roman" panose="02020603050405020304" pitchFamily="18" charset="0"/>
-                <a:cs typeface="Times New Roman" panose="02020603050405020304" pitchFamily="18" charset="0"/>
-              </a:rPr>
-              <a:t>: State-of-the-art, 1536-dim, legal domain coverage</a:t>
-            </a:r>
-          </a:p>
-          <a:p>
-            <a:pPr marL="171450" indent="-171450">
-              <a:buFont typeface="Arial" panose="020B0604020202020204" pitchFamily="34" charset="0"/>
-              <a:buChar char="•"/>
-            </a:pPr>
-            <a:r>
-              <a:rPr lang="en-IN" sz="1400" b="1" dirty="0">
-                <a:latin typeface="Times New Roman" panose="02020603050405020304" pitchFamily="18" charset="0"/>
-                <a:cs typeface="Times New Roman" panose="02020603050405020304" pitchFamily="18" charset="0"/>
-              </a:rPr>
-              <a:t>Cons</a:t>
-            </a:r>
-            <a:r>
-              <a:rPr lang="en-IN" sz="1400" dirty="0">
-                <a:latin typeface="Times New Roman" panose="02020603050405020304" pitchFamily="18" charset="0"/>
-                <a:cs typeface="Times New Roman" panose="02020603050405020304" pitchFamily="18" charset="0"/>
-              </a:rPr>
-              <a:t>: API cost, latency, no offline fallback</a:t>
-            </a:r>
-          </a:p>
-          <a:p>
-            <a:pPr marL="171450" indent="-171450">
-              <a:buFont typeface="Arial" panose="020B0604020202020204" pitchFamily="34" charset="0"/>
-              <a:buChar char="•"/>
-            </a:pPr>
-            <a:r>
-              <a:rPr lang="en-IN" sz="1400" b="1" dirty="0">
-                <a:latin typeface="Times New Roman" panose="02020603050405020304" pitchFamily="18" charset="0"/>
-                <a:cs typeface="Times New Roman" panose="02020603050405020304" pitchFamily="18" charset="0"/>
-              </a:rPr>
-              <a:t>Decision</a:t>
-            </a:r>
-            <a:r>
-              <a:rPr lang="en-IN" sz="1400" dirty="0">
-                <a:latin typeface="Times New Roman" panose="02020603050405020304" pitchFamily="18" charset="0"/>
-                <a:cs typeface="Times New Roman" panose="02020603050405020304" pitchFamily="18" charset="0"/>
-              </a:rPr>
-              <a:t>: Not for prototype; local model preferred for </a:t>
-            </a:r>
-            <a:r>
-              <a:rPr lang="en-IN" sz="1400" dirty="0" err="1">
-                <a:latin typeface="Times New Roman" panose="02020603050405020304" pitchFamily="18" charset="0"/>
-                <a:cs typeface="Times New Roman" panose="02020603050405020304" pitchFamily="18" charset="0"/>
-              </a:rPr>
-              <a:t>deployability</a:t>
-            </a:r>
-            <a:endParaRPr lang="en-IN" sz="1400" dirty="0">
-              <a:latin typeface="Times New Roman" panose="02020603050405020304" pitchFamily="18" charset="0"/>
-              <a:cs typeface="Times New Roman" panose="02020603050405020304" pitchFamily="18" charset="0"/>
-            </a:endParaRPr>
-          </a:p>
-          <a:p>
-            <a:pPr>
-              <a:buNone/>
-            </a:pPr>
-            <a:r>
-              <a:rPr lang="en-IN" sz="1400" b="1" dirty="0">
-                <a:latin typeface="Times New Roman" panose="02020603050405020304" pitchFamily="18" charset="0"/>
-                <a:cs typeface="Times New Roman" panose="02020603050405020304" pitchFamily="18" charset="0"/>
-              </a:rPr>
-              <a:t>Alternative Considered: Dense Passage Retrieval (DPR)</a:t>
-            </a:r>
-          </a:p>
-          <a:p>
-            <a:pPr marL="171450" indent="-171450">
-              <a:buFont typeface="Arial" panose="020B0604020202020204" pitchFamily="34" charset="0"/>
-              <a:buChar char="•"/>
-            </a:pPr>
-            <a:r>
-              <a:rPr lang="en-IN" sz="1400" b="1" dirty="0">
-                <a:latin typeface="Times New Roman" panose="02020603050405020304" pitchFamily="18" charset="0"/>
-                <a:cs typeface="Times New Roman" panose="02020603050405020304" pitchFamily="18" charset="0"/>
-              </a:rPr>
-              <a:t>Pros</a:t>
-            </a:r>
-            <a:r>
-              <a:rPr lang="en-IN" sz="1400" dirty="0">
-                <a:latin typeface="Times New Roman" panose="02020603050405020304" pitchFamily="18" charset="0"/>
-                <a:cs typeface="Times New Roman" panose="02020603050405020304" pitchFamily="18" charset="0"/>
-              </a:rPr>
-              <a:t>: Jointly trained retriever &amp; reader, strong legal domain potential</a:t>
-            </a:r>
-          </a:p>
-          <a:p>
-            <a:pPr marL="171450" indent="-171450">
-              <a:buFont typeface="Arial" panose="020B0604020202020204" pitchFamily="34" charset="0"/>
-              <a:buChar char="•"/>
-            </a:pPr>
-            <a:r>
-              <a:rPr lang="en-IN" sz="1400" b="1" dirty="0">
-                <a:latin typeface="Times New Roman" panose="02020603050405020304" pitchFamily="18" charset="0"/>
-                <a:cs typeface="Times New Roman" panose="02020603050405020304" pitchFamily="18" charset="0"/>
-              </a:rPr>
-              <a:t>Cons</a:t>
-            </a:r>
-            <a:r>
-              <a:rPr lang="en-IN" sz="1400" dirty="0">
-                <a:latin typeface="Times New Roman" panose="02020603050405020304" pitchFamily="18" charset="0"/>
-                <a:cs typeface="Times New Roman" panose="02020603050405020304" pitchFamily="18" charset="0"/>
-              </a:rPr>
-              <a:t>: Larger model (300M+), requires GPU, training overhead</a:t>
-            </a:r>
-          </a:p>
-          <a:p>
-            <a:pPr marL="171450" indent="-171450">
-              <a:buFont typeface="Arial" panose="020B0604020202020204" pitchFamily="34" charset="0"/>
-              <a:buChar char="•"/>
-            </a:pPr>
-            <a:r>
-              <a:rPr lang="en-IN" sz="1400" b="1" dirty="0">
-                <a:latin typeface="Times New Roman" panose="02020603050405020304" pitchFamily="18" charset="0"/>
-                <a:cs typeface="Times New Roman" panose="02020603050405020304" pitchFamily="18" charset="0"/>
-              </a:rPr>
-              <a:t>Decision</a:t>
-            </a:r>
-            <a:r>
-              <a:rPr lang="en-IN" sz="1400" dirty="0">
-                <a:latin typeface="Times New Roman" panose="02020603050405020304" pitchFamily="18" charset="0"/>
-                <a:cs typeface="Times New Roman" panose="02020603050405020304" pitchFamily="18" charset="0"/>
-              </a:rPr>
-              <a:t>: Overkill for 4-document prototype; all-</a:t>
-            </a:r>
-            <a:r>
-              <a:rPr lang="en-IN" sz="1400" dirty="0" err="1">
-                <a:latin typeface="Times New Roman" panose="02020603050405020304" pitchFamily="18" charset="0"/>
-                <a:cs typeface="Times New Roman" panose="02020603050405020304" pitchFamily="18" charset="0"/>
-              </a:rPr>
-              <a:t>MiniLM</a:t>
-            </a:r>
-            <a:r>
-              <a:rPr lang="en-IN" sz="1400" dirty="0">
-                <a:latin typeface="Times New Roman" panose="02020603050405020304" pitchFamily="18" charset="0"/>
-                <a:cs typeface="Times New Roman" panose="02020603050405020304" pitchFamily="18" charset="0"/>
-              </a:rPr>
-              <a:t> sufficient</a:t>
-            </a:r>
-          </a:p>
-        </p:txBody>
-      </p:sp>
-    </p:spTree>
-    <p:extLst>
-      <p:ext uri="{BB962C8B-B14F-4D97-AF65-F5344CB8AC3E}">
-        <p14:creationId xmlns:p14="http://schemas.microsoft.com/office/powerpoint/2010/main" val="2882015641"/>
-      </p:ext>
-    </p:extLst>
-  </p:cSld>
-  <p:clrMapOvr>
-    <a:masterClrMapping/>
-  </p:clrMapOvr>
-</p:sld>
-</file>
-
-<file path=ppt/slides/slide11.xml><?xml version="1.0" encoding="utf-8"?>
-<p:sld xmlns:a="http://schemas.openxmlformats.org/drawingml/2006/main" xmlns:r="http://schemas.openxmlformats.org/officeDocument/2006/relationships" xmlns:p="http://schemas.openxmlformats.org/presentationml/2006/main">
-  <p:cSld>
-    <p:spTree>
-      <p:nvGrpSpPr>
-        <p:cNvPr id="1" name=""/>
-        <p:cNvGrpSpPr/>
-        <p:nvPr/>
-      </p:nvGrpSpPr>
-      <p:grpSpPr>
-        <a:xfrm>
-          <a:off x="0" y="0"/>
-          <a:ext cx="0" cy="0"/>
-          <a:chOff x="0" y="0"/>
-          <a:chExt cx="0" cy="0"/>
-        </a:xfrm>
-      </p:grpSpPr>
-      <p:sp>
-        <p:nvSpPr>
           <p:cNvPr id="2" name="Title 1">
             <a:extLst>
               <a:ext uri="{FF2B5EF4-FFF2-40B4-BE49-F238E27FC236}">
@@ -8953,225 +8329,6 @@
 </file>
 
 <file path=ppt/slides/slide3.xml><?xml version="1.0" encoding="utf-8"?>
-<p:sld xmlns:a="http://schemas.openxmlformats.org/drawingml/2006/main" xmlns:r="http://schemas.openxmlformats.org/officeDocument/2006/relationships" xmlns:p="http://schemas.openxmlformats.org/presentationml/2006/main">
-  <p:cSld>
-    <p:spTree>
-      <p:nvGrpSpPr>
-        <p:cNvPr id="1" name=""/>
-        <p:cNvGrpSpPr/>
-        <p:nvPr/>
-      </p:nvGrpSpPr>
-      <p:grpSpPr>
-        <a:xfrm>
-          <a:off x="0" y="0"/>
-          <a:ext cx="0" cy="0"/>
-          <a:chOff x="0" y="0"/>
-          <a:chExt cx="0" cy="0"/>
-        </a:xfrm>
-      </p:grpSpPr>
-      <p:sp>
-        <p:nvSpPr>
-          <p:cNvPr id="2" name="Title 1">
-            <a:extLst>
-              <a:ext uri="{FF2B5EF4-FFF2-40B4-BE49-F238E27FC236}">
-                <a16:creationId xmlns:a16="http://schemas.microsoft.com/office/drawing/2014/main" id="{AC68D7C3-C676-9DE0-DB5D-F7C06936239B}"/>
-              </a:ext>
-            </a:extLst>
-          </p:cNvPr>
-          <p:cNvSpPr>
-            <a:spLocks noGrp="1"/>
-          </p:cNvSpPr>
-          <p:nvPr>
-            <p:ph type="title"/>
-          </p:nvPr>
-        </p:nvSpPr>
-        <p:spPr/>
-        <p:txBody>
-          <a:bodyPr/>
-          <a:lstStyle/>
-          <a:p>
-            <a:endParaRPr lang="en-US"/>
-          </a:p>
-        </p:txBody>
-      </p:sp>
-      <p:sp>
-        <p:nvSpPr>
-          <p:cNvPr id="3" name="Content Placeholder 2">
-            <a:extLst>
-              <a:ext uri="{FF2B5EF4-FFF2-40B4-BE49-F238E27FC236}">
-                <a16:creationId xmlns:a16="http://schemas.microsoft.com/office/drawing/2014/main" id="{15A84AAB-8B44-F237-7DE3-B058BA7C481C}"/>
-              </a:ext>
-            </a:extLst>
-          </p:cNvPr>
-          <p:cNvSpPr>
-            <a:spLocks noGrp="1"/>
-          </p:cNvSpPr>
-          <p:nvPr>
-            <p:ph idx="1"/>
-          </p:nvPr>
-        </p:nvSpPr>
-        <p:spPr/>
-        <p:txBody>
-          <a:bodyPr/>
-          <a:lstStyle/>
-          <a:p>
-            <a:pPr>
-              <a:spcBef>
-                <a:spcPts val="600"/>
-              </a:spcBef>
-              <a:spcAft>
-                <a:spcPts val="600"/>
-              </a:spcAft>
-              <a:defRPr sz="1600">
-                <a:solidFill>
-                  <a:srgbClr val="323232"/>
-                </a:solidFill>
-              </a:defRPr>
-            </a:pPr>
-            <a:r>
-              <a:rPr lang="en-IN" dirty="0"/>
-              <a:t>✓ Semantic Search: Find clauses by meaning, not just keywords</a:t>
-            </a:r>
-          </a:p>
-          <a:p>
-            <a:pPr>
-              <a:spcBef>
-                <a:spcPts val="600"/>
-              </a:spcBef>
-              <a:spcAft>
-                <a:spcPts val="600"/>
-              </a:spcAft>
-              <a:defRPr sz="1600">
-                <a:solidFill>
-                  <a:srgbClr val="323232"/>
-                </a:solidFill>
-              </a:defRPr>
-            </a:pPr>
-            <a:r>
-              <a:rPr lang="en-IN" dirty="0"/>
-              <a:t>✓ Hybrid Retrieval: Combine keyword-based &amp; semantic retrieval</a:t>
-            </a:r>
-          </a:p>
-          <a:p>
-            <a:pPr>
-              <a:spcBef>
-                <a:spcPts val="600"/>
-              </a:spcBef>
-              <a:spcAft>
-                <a:spcPts val="600"/>
-              </a:spcAft>
-              <a:defRPr sz="1600">
-                <a:solidFill>
-                  <a:srgbClr val="323232"/>
-                </a:solidFill>
-              </a:defRPr>
-            </a:pPr>
-            <a:r>
-              <a:rPr lang="en-IN" dirty="0"/>
-              <a:t>✓ Evidence Grounding: Answers backed by contract excerpts</a:t>
-            </a:r>
-          </a:p>
-          <a:p>
-            <a:pPr>
-              <a:spcBef>
-                <a:spcPts val="600"/>
-              </a:spcBef>
-              <a:spcAft>
-                <a:spcPts val="600"/>
-              </a:spcAft>
-              <a:defRPr sz="1600">
-                <a:solidFill>
-                  <a:srgbClr val="323232"/>
-                </a:solidFill>
-              </a:defRPr>
-            </a:pPr>
-            <a:r>
-              <a:rPr lang="en-IN" dirty="0"/>
-              <a:t>✓ Multi-Intent Support: Handle QA, risk scans, conflict detection</a:t>
-            </a:r>
-          </a:p>
-          <a:p>
-            <a:pPr>
-              <a:spcBef>
-                <a:spcPts val="600"/>
-              </a:spcBef>
-              <a:spcAft>
-                <a:spcPts val="600"/>
-              </a:spcAft>
-              <a:defRPr sz="1600">
-                <a:solidFill>
-                  <a:srgbClr val="323232"/>
-                </a:solidFill>
-              </a:defRPr>
-            </a:pPr>
-            <a:r>
-              <a:rPr lang="en-IN" dirty="0"/>
-              <a:t>✓ Legal Structure Extraction: Parse clauses into structured concepts</a:t>
-            </a:r>
-          </a:p>
-          <a:p>
-            <a:pPr>
-              <a:spcBef>
-                <a:spcPts val="600"/>
-              </a:spcBef>
-              <a:spcAft>
-                <a:spcPts val="600"/>
-              </a:spcAft>
-              <a:defRPr sz="1600">
-                <a:solidFill>
-                  <a:srgbClr val="323232"/>
-                </a:solidFill>
-              </a:defRPr>
-            </a:pPr>
-            <a:r>
-              <a:rPr lang="en-IN" dirty="0"/>
-              <a:t>✓ Risk Scoring: Identify high/medium/low severity patterns</a:t>
-            </a:r>
-          </a:p>
-          <a:p>
-            <a:endParaRPr lang="en-US" dirty="0"/>
-          </a:p>
-        </p:txBody>
-      </p:sp>
-      <p:sp>
-        <p:nvSpPr>
-          <p:cNvPr id="4" name="Text Placeholder 3">
-            <a:extLst>
-              <a:ext uri="{FF2B5EF4-FFF2-40B4-BE49-F238E27FC236}">
-                <a16:creationId xmlns:a16="http://schemas.microsoft.com/office/drawing/2014/main" id="{B6851617-B83F-BAAD-571D-F94A85D180AA}"/>
-              </a:ext>
-            </a:extLst>
-          </p:cNvPr>
-          <p:cNvSpPr>
-            <a:spLocks noGrp="1"/>
-          </p:cNvSpPr>
-          <p:nvPr>
-            <p:ph type="body" sz="half" idx="2"/>
-          </p:nvPr>
-        </p:nvSpPr>
-        <p:spPr/>
-        <p:txBody>
-          <a:bodyPr/>
-          <a:lstStyle/>
-          <a:p>
-            <a:endParaRPr lang="en-US"/>
-          </a:p>
-        </p:txBody>
-      </p:sp>
-    </p:spTree>
-    <p:extLst>
-      <p:ext uri="{BB962C8B-B14F-4D97-AF65-F5344CB8AC3E}">
-        <p14:creationId xmlns:p14="http://schemas.microsoft.com/office/powerpoint/2010/main" val="4223502984"/>
-      </p:ext>
-    </p:extLst>
-  </p:cSld>
-  <p:clrMapOvr>
-    <a:masterClrMapping/>
-  </p:clrMapOvr>
-</p:sld>
-</file>
-
-<file path=ppt/slides/slide4.xml><?xml version="1.0" encoding="utf-8"?>
 <p:sld xmlns:a="http://schemas.openxmlformats.org/drawingml/2006/main" xmlns:r="http://schemas.openxmlformats.org/officeDocument/2006/relationships" xmlns:p="http://schemas.openxmlformats.org/presentationml/2006/main">
   <p:cSld>
     <p:bg>
@@ -9338,7 +8495,7 @@
 </p:sld>
 </file>
 
-<file path=ppt/slides/slide5.xml><?xml version="1.0" encoding="utf-8"?>
+<file path=ppt/slides/slide4.xml><?xml version="1.0" encoding="utf-8"?>
 <p:sld xmlns:a="http://schemas.openxmlformats.org/drawingml/2006/main" xmlns:r="http://schemas.openxmlformats.org/officeDocument/2006/relationships" xmlns:p="http://schemas.openxmlformats.org/presentationml/2006/main">
   <p:cSld>
     <p:spTree>
@@ -9473,7 +8630,7 @@
 </p:sld>
 </file>
 
-<file path=ppt/slides/slide6.xml><?xml version="1.0" encoding="utf-8"?>
+<file path=ppt/slides/slide5.xml><?xml version="1.0" encoding="utf-8"?>
 <p:sld xmlns:a="http://schemas.openxmlformats.org/drawingml/2006/main" xmlns:r="http://schemas.openxmlformats.org/officeDocument/2006/relationships" xmlns:p="http://schemas.openxmlformats.org/presentationml/2006/main">
   <p:cSld>
     <p:spTree>
@@ -9626,7 +8783,7 @@
 </p:sld>
 </file>
 
-<file path=ppt/slides/slide7.xml><?xml version="1.0" encoding="utf-8"?>
+<file path=ppt/slides/slide6.xml><?xml version="1.0" encoding="utf-8"?>
 <p:sld xmlns:a="http://schemas.openxmlformats.org/drawingml/2006/main" xmlns:r="http://schemas.openxmlformats.org/officeDocument/2006/relationships" xmlns:p="http://schemas.openxmlformats.org/presentationml/2006/main">
   <p:cSld>
     <p:spTree>
@@ -9803,7 +8960,7 @@
 </p:sld>
 </file>
 
-<file path=ppt/slides/slide8.xml><?xml version="1.0" encoding="utf-8"?>
+<file path=ppt/slides/slide7.xml><?xml version="1.0" encoding="utf-8"?>
 <p:sld xmlns:a="http://schemas.openxmlformats.org/drawingml/2006/main" xmlns:r="http://schemas.openxmlformats.org/officeDocument/2006/relationships" xmlns:p="http://schemas.openxmlformats.org/presentationml/2006/main">
   <p:cSld>
     <p:spTree>
@@ -9870,7 +9027,7 @@
 </p:sld>
 </file>
 
-<file path=ppt/slides/slide9.xml><?xml version="1.0" encoding="utf-8"?>
+<file path=ppt/slides/slide8.xml><?xml version="1.0" encoding="utf-8"?>
 <p:sld xmlns:a="http://schemas.openxmlformats.org/drawingml/2006/main" xmlns:r="http://schemas.openxmlformats.org/officeDocument/2006/relationships" xmlns:p="http://schemas.openxmlformats.org/presentationml/2006/main">
   <p:cSld>
     <p:bg>
@@ -12045,6 +11202,634 @@
 </p:sld>
 </file>
 
+<file path=ppt/slides/slide9.xml><?xml version="1.0" encoding="utf-8"?>
+<p:sld xmlns:a="http://schemas.openxmlformats.org/drawingml/2006/main" xmlns:r="http://schemas.openxmlformats.org/officeDocument/2006/relationships" xmlns:p="http://schemas.openxmlformats.org/presentationml/2006/main">
+  <p:cSld>
+    <p:spTree>
+      <p:nvGrpSpPr>
+        <p:cNvPr id="1" name=""/>
+        <p:cNvGrpSpPr/>
+        <p:nvPr/>
+      </p:nvGrpSpPr>
+      <p:grpSpPr>
+        <a:xfrm>
+          <a:off x="0" y="0"/>
+          <a:ext cx="0" cy="0"/>
+          <a:chOff x="0" y="0"/>
+          <a:chExt cx="0" cy="0"/>
+        </a:xfrm>
+      </p:grpSpPr>
+      <p:sp>
+        <p:nvSpPr>
+          <p:cNvPr id="3" name="Title 1">
+            <a:extLst>
+              <a:ext uri="{FF2B5EF4-FFF2-40B4-BE49-F238E27FC236}">
+                <a16:creationId xmlns:a16="http://schemas.microsoft.com/office/drawing/2014/main" id="{76AD70EA-FF3A-6043-507B-5C16D4837DAD}"/>
+              </a:ext>
+            </a:extLst>
+          </p:cNvPr>
+          <p:cNvSpPr txBox="1">
+            <a:spLocks/>
+          </p:cNvSpPr>
+          <p:nvPr/>
+        </p:nvSpPr>
+        <p:spPr>
+          <a:xfrm>
+            <a:off x="1307955" y="176991"/>
+            <a:ext cx="8929815" cy="2035628"/>
+          </a:xfrm>
+          <a:prstGeom prst="rect">
+            <a:avLst/>
+          </a:prstGeom>
+        </p:spPr>
+        <p:txBody>
+          <a:bodyPr vert="horz" lIns="91440" tIns="45720" rIns="91440" bIns="45720" rtlCol="0" anchor="t">
+            <a:normAutofit/>
+          </a:bodyPr>
+          <a:lstStyle>
+            <a:lvl1pPr algn="l" defTabSz="914400" rtl="0" eaLnBrk="1" latinLnBrk="0" hangingPunct="1">
+              <a:lnSpc>
+                <a:spcPct val="89000"/>
+              </a:lnSpc>
+              <a:spcBef>
+                <a:spcPct val="0"/>
+              </a:spcBef>
+              <a:buNone/>
+              <a:defRPr sz="4400" kern="1200" baseline="0">
+                <a:solidFill>
+                  <a:schemeClr val="tx2"/>
+                </a:solidFill>
+                <a:latin typeface="+mj-lt"/>
+                <a:ea typeface="+mj-ea"/>
+                <a:cs typeface="+mj-cs"/>
+              </a:defRPr>
+            </a:lvl1pPr>
+          </a:lstStyle>
+          <a:p>
+            <a:r>
+              <a:rPr lang="en-IN" b="1" dirty="0"/>
+              <a:t>Embeddings Strategy</a:t>
+            </a:r>
+          </a:p>
+        </p:txBody>
+      </p:sp>
+      <p:sp>
+        <p:nvSpPr>
+          <p:cNvPr id="5" name="TextBox 4">
+            <a:extLst>
+              <a:ext uri="{FF2B5EF4-FFF2-40B4-BE49-F238E27FC236}">
+                <a16:creationId xmlns:a16="http://schemas.microsoft.com/office/drawing/2014/main" id="{CA5CAA1B-1E4E-9D3C-D697-B2DBF34247B9}"/>
+              </a:ext>
+            </a:extLst>
+          </p:cNvPr>
+          <p:cNvSpPr txBox="1"/>
+          <p:nvPr/>
+        </p:nvSpPr>
+        <p:spPr>
+          <a:xfrm>
+            <a:off x="946894" y="1194805"/>
+            <a:ext cx="5526477" cy="5262979"/>
+          </a:xfrm>
+          <a:prstGeom prst="rect">
+            <a:avLst/>
+          </a:prstGeom>
+          <a:noFill/>
+        </p:spPr>
+        <p:txBody>
+          <a:bodyPr wrap="square">
+            <a:spAutoFit/>
+          </a:bodyPr>
+          <a:lstStyle/>
+          <a:p>
+            <a:r>
+              <a:rPr lang="en-IN" sz="1400" b="1" dirty="0">
+                <a:latin typeface="Times New Roman" panose="02020603050405020304" pitchFamily="18" charset="0"/>
+                <a:cs typeface="Times New Roman" panose="02020603050405020304" pitchFamily="18" charset="0"/>
+              </a:rPr>
+              <a:t>Decision: Sentence-BERT (all-MiniLM-L6-v2) + BM25</a:t>
+            </a:r>
+          </a:p>
+          <a:p>
+            <a:endParaRPr lang="en-IN" sz="1400" b="1" dirty="0">
+              <a:latin typeface="Times New Roman" panose="02020603050405020304" pitchFamily="18" charset="0"/>
+              <a:cs typeface="Times New Roman" panose="02020603050405020304" pitchFamily="18" charset="0"/>
+            </a:endParaRPr>
+          </a:p>
+          <a:p>
+            <a:pPr lvl="1"/>
+            <a:r>
+              <a:rPr lang="en-IN" sz="1400" b="1" dirty="0">
+                <a:latin typeface="Times New Roman" panose="02020603050405020304" pitchFamily="18" charset="0"/>
+                <a:cs typeface="Times New Roman" panose="02020603050405020304" pitchFamily="18" charset="0"/>
+              </a:rPr>
+              <a:t>Selected Model</a:t>
+            </a:r>
+            <a:r>
+              <a:rPr lang="en-IN" sz="1400" dirty="0">
+                <a:latin typeface="Times New Roman" panose="02020603050405020304" pitchFamily="18" charset="0"/>
+                <a:cs typeface="Times New Roman" panose="02020603050405020304" pitchFamily="18" charset="0"/>
+              </a:rPr>
+              <a:t>: sentence-transformers/all-MiniLM-L6-v2</a:t>
+            </a:r>
+          </a:p>
+          <a:p>
+            <a:pPr lvl="1"/>
+            <a:r>
+              <a:rPr lang="en-IN" sz="1400" b="1" dirty="0">
+                <a:latin typeface="Times New Roman" panose="02020603050405020304" pitchFamily="18" charset="0"/>
+                <a:cs typeface="Times New Roman" panose="02020603050405020304" pitchFamily="18" charset="0"/>
+              </a:rPr>
+              <a:t>Characteristics</a:t>
+            </a:r>
+            <a:r>
+              <a:rPr lang="en-IN" sz="1400" dirty="0">
+                <a:latin typeface="Times New Roman" panose="02020603050405020304" pitchFamily="18" charset="0"/>
+                <a:cs typeface="Times New Roman" panose="02020603050405020304" pitchFamily="18" charset="0"/>
+              </a:rPr>
+              <a:t>:</a:t>
+            </a:r>
+          </a:p>
+          <a:p>
+            <a:pPr marL="742950" lvl="1" indent="-285750">
+              <a:buFont typeface="Arial" panose="020B0604020202020204" pitchFamily="34" charset="0"/>
+              <a:buChar char="•"/>
+            </a:pPr>
+            <a:r>
+              <a:rPr lang="en-IN" sz="1400" b="1" dirty="0">
+                <a:latin typeface="Times New Roman" panose="02020603050405020304" pitchFamily="18" charset="0"/>
+                <a:cs typeface="Times New Roman" panose="02020603050405020304" pitchFamily="18" charset="0"/>
+              </a:rPr>
+              <a:t>Architecture</a:t>
+            </a:r>
+            <a:r>
+              <a:rPr lang="en-IN" sz="1400" dirty="0">
+                <a:latin typeface="Times New Roman" panose="02020603050405020304" pitchFamily="18" charset="0"/>
+                <a:cs typeface="Times New Roman" panose="02020603050405020304" pitchFamily="18" charset="0"/>
+              </a:rPr>
+              <a:t>: </a:t>
+            </a:r>
+            <a:r>
+              <a:rPr lang="en-IN" sz="1400" dirty="0" err="1">
+                <a:latin typeface="Times New Roman" panose="02020603050405020304" pitchFamily="18" charset="0"/>
+                <a:cs typeface="Times New Roman" panose="02020603050405020304" pitchFamily="18" charset="0"/>
+              </a:rPr>
+              <a:t>DistilBERT</a:t>
+            </a:r>
+            <a:r>
+              <a:rPr lang="en-IN" sz="1400" dirty="0">
+                <a:latin typeface="Times New Roman" panose="02020603050405020304" pitchFamily="18" charset="0"/>
+                <a:cs typeface="Times New Roman" panose="02020603050405020304" pitchFamily="18" charset="0"/>
+              </a:rPr>
+              <a:t>-based sentence embeddings</a:t>
+            </a:r>
+          </a:p>
+          <a:p>
+            <a:pPr marL="742950" lvl="1" indent="-285750">
+              <a:buFont typeface="Arial" panose="020B0604020202020204" pitchFamily="34" charset="0"/>
+              <a:buChar char="•"/>
+            </a:pPr>
+            <a:r>
+              <a:rPr lang="en-IN" sz="1400" b="1" dirty="0">
+                <a:latin typeface="Times New Roman" panose="02020603050405020304" pitchFamily="18" charset="0"/>
+                <a:cs typeface="Times New Roman" panose="02020603050405020304" pitchFamily="18" charset="0"/>
+              </a:rPr>
+              <a:t>Dimension</a:t>
+            </a:r>
+            <a:r>
+              <a:rPr lang="en-IN" sz="1400" dirty="0">
+                <a:latin typeface="Times New Roman" panose="02020603050405020304" pitchFamily="18" charset="0"/>
+                <a:cs typeface="Times New Roman" panose="02020603050405020304" pitchFamily="18" charset="0"/>
+              </a:rPr>
+              <a:t>: 384 (vs. 768 for full BERT, 1536 for OpenAI)</a:t>
+            </a:r>
+          </a:p>
+          <a:p>
+            <a:pPr marL="742950" lvl="1" indent="-285750">
+              <a:buFont typeface="Arial" panose="020B0604020202020204" pitchFamily="34" charset="0"/>
+              <a:buChar char="•"/>
+            </a:pPr>
+            <a:r>
+              <a:rPr lang="en-IN" sz="1400" b="1" dirty="0">
+                <a:latin typeface="Times New Roman" panose="02020603050405020304" pitchFamily="18" charset="0"/>
+                <a:cs typeface="Times New Roman" panose="02020603050405020304" pitchFamily="18" charset="0"/>
+              </a:rPr>
+              <a:t>Parameters</a:t>
+            </a:r>
+            <a:r>
+              <a:rPr lang="en-IN" sz="1400" dirty="0">
+                <a:latin typeface="Times New Roman" panose="02020603050405020304" pitchFamily="18" charset="0"/>
+                <a:cs typeface="Times New Roman" panose="02020603050405020304" pitchFamily="18" charset="0"/>
+              </a:rPr>
+              <a:t>: 22M (lightweight, &lt;200MB memory)</a:t>
+            </a:r>
+          </a:p>
+          <a:p>
+            <a:pPr lvl="1"/>
+            <a:r>
+              <a:rPr lang="en-IN" sz="1400" b="1" dirty="0">
+                <a:latin typeface="Times New Roman" panose="02020603050405020304" pitchFamily="18" charset="0"/>
+                <a:cs typeface="Times New Roman" panose="02020603050405020304" pitchFamily="18" charset="0"/>
+              </a:rPr>
+              <a:t>Why This Choice</a:t>
+            </a:r>
+            <a:r>
+              <a:rPr lang="en-IN" sz="1400" dirty="0">
+                <a:latin typeface="Times New Roman" panose="02020603050405020304" pitchFamily="18" charset="0"/>
+                <a:cs typeface="Times New Roman" panose="02020603050405020304" pitchFamily="18" charset="0"/>
+              </a:rPr>
+              <a:t>:</a:t>
+            </a:r>
+          </a:p>
+          <a:p>
+            <a:pPr lvl="1">
+              <a:buFont typeface="+mj-lt"/>
+              <a:buAutoNum type="arabicPeriod"/>
+            </a:pPr>
+            <a:r>
+              <a:rPr lang="en-IN" sz="1400" b="1" dirty="0">
+                <a:latin typeface="Times New Roman" panose="02020603050405020304" pitchFamily="18" charset="0"/>
+                <a:cs typeface="Times New Roman" panose="02020603050405020304" pitchFamily="18" charset="0"/>
+              </a:rPr>
+              <a:t>Legal Domain Applicability</a:t>
+            </a:r>
+            <a:r>
+              <a:rPr lang="en-IN" sz="1400" dirty="0">
+                <a:latin typeface="Times New Roman" panose="02020603050405020304" pitchFamily="18" charset="0"/>
+                <a:cs typeface="Times New Roman" panose="02020603050405020304" pitchFamily="18" charset="0"/>
+              </a:rPr>
+              <a:t>:</a:t>
+            </a:r>
+          </a:p>
+          <a:p>
+            <a:pPr marL="1200150" lvl="2" indent="-285750">
+              <a:buFont typeface="+mj-lt"/>
+              <a:buAutoNum type="arabicPeriod"/>
+            </a:pPr>
+            <a:r>
+              <a:rPr lang="en-IN" sz="1400" dirty="0">
+                <a:latin typeface="Times New Roman" panose="02020603050405020304" pitchFamily="18" charset="0"/>
+                <a:cs typeface="Times New Roman" panose="02020603050405020304" pitchFamily="18" charset="0"/>
+              </a:rPr>
+              <a:t>Trained on diverse corpora (including legal-adjacent datasets)</a:t>
+            </a:r>
+          </a:p>
+          <a:p>
+            <a:pPr marL="1200150" lvl="2" indent="-285750">
+              <a:buFont typeface="+mj-lt"/>
+              <a:buAutoNum type="arabicPeriod"/>
+            </a:pPr>
+            <a:r>
+              <a:rPr lang="en-IN" sz="1400" dirty="0">
+                <a:latin typeface="Times New Roman" panose="02020603050405020304" pitchFamily="18" charset="0"/>
+                <a:cs typeface="Times New Roman" panose="02020603050405020304" pitchFamily="18" charset="0"/>
+              </a:rPr>
+              <a:t>Captures semantic similarity for contract language</a:t>
+            </a:r>
+          </a:p>
+          <a:p>
+            <a:pPr marL="1200150" lvl="2" indent="-285750">
+              <a:buFont typeface="+mj-lt"/>
+              <a:buAutoNum type="arabicPeriod"/>
+            </a:pPr>
+            <a:r>
+              <a:rPr lang="en-IN" sz="1400" dirty="0">
+                <a:latin typeface="Times New Roman" panose="02020603050405020304" pitchFamily="18" charset="0"/>
+                <a:cs typeface="Times New Roman" panose="02020603050405020304" pitchFamily="18" charset="0"/>
+              </a:rPr>
+              <a:t>Example: "termination by either party" ≈ "right to terminate" (high cosine similarity)</a:t>
+            </a:r>
+          </a:p>
+          <a:p>
+            <a:pPr lvl="1">
+              <a:buFont typeface="+mj-lt"/>
+              <a:buAutoNum type="arabicPeriod"/>
+            </a:pPr>
+            <a:r>
+              <a:rPr lang="en-IN" sz="1400" b="1" dirty="0">
+                <a:latin typeface="Times New Roman" panose="02020603050405020304" pitchFamily="18" charset="0"/>
+                <a:cs typeface="Times New Roman" panose="02020603050405020304" pitchFamily="18" charset="0"/>
+              </a:rPr>
+              <a:t>Efficiency for Lightweight Deployment</a:t>
+            </a:r>
+            <a:r>
+              <a:rPr lang="en-IN" sz="1400" dirty="0">
+                <a:latin typeface="Times New Roman" panose="02020603050405020304" pitchFamily="18" charset="0"/>
+                <a:cs typeface="Times New Roman" panose="02020603050405020304" pitchFamily="18" charset="0"/>
+              </a:rPr>
+              <a:t>:</a:t>
+            </a:r>
+          </a:p>
+          <a:p>
+            <a:pPr marL="1200150" lvl="2" indent="-285750">
+              <a:buFont typeface="+mj-lt"/>
+              <a:buAutoNum type="arabicPeriod"/>
+            </a:pPr>
+            <a:r>
+              <a:rPr lang="en-IN" sz="1400" dirty="0">
+                <a:latin typeface="Times New Roman" panose="02020603050405020304" pitchFamily="18" charset="0"/>
+                <a:cs typeface="Times New Roman" panose="02020603050405020304" pitchFamily="18" charset="0"/>
+              </a:rPr>
+              <a:t>384-dim embeddings → fast cosine similarity computation</a:t>
+            </a:r>
+          </a:p>
+          <a:p>
+            <a:pPr marL="1200150" lvl="2" indent="-285750">
+              <a:buFont typeface="+mj-lt"/>
+              <a:buAutoNum type="arabicPeriod"/>
+            </a:pPr>
+            <a:r>
+              <a:rPr lang="en-IN" sz="1400" dirty="0">
+                <a:latin typeface="Times New Roman" panose="02020603050405020304" pitchFamily="18" charset="0"/>
+                <a:cs typeface="Times New Roman" panose="02020603050405020304" pitchFamily="18" charset="0"/>
+              </a:rPr>
+              <a:t>Batch processing: 1000 chunks in &lt;2 seconds</a:t>
+            </a:r>
+          </a:p>
+          <a:p>
+            <a:pPr marL="1200150" lvl="2" indent="-285750">
+              <a:buFont typeface="+mj-lt"/>
+              <a:buAutoNum type="arabicPeriod"/>
+            </a:pPr>
+            <a:r>
+              <a:rPr lang="en-IN" sz="1400" dirty="0">
+                <a:latin typeface="Times New Roman" panose="02020603050405020304" pitchFamily="18" charset="0"/>
+                <a:cs typeface="Times New Roman" panose="02020603050405020304" pitchFamily="18" charset="0"/>
+              </a:rPr>
+              <a:t>Memory efficient: 250 chunks × 384 floats = ~390KB</a:t>
+            </a:r>
+          </a:p>
+          <a:p>
+            <a:pPr lvl="1">
+              <a:buFont typeface="+mj-lt"/>
+              <a:buAutoNum type="arabicPeriod"/>
+            </a:pPr>
+            <a:r>
+              <a:rPr lang="en-IN" sz="1400" b="1" dirty="0">
+                <a:latin typeface="Times New Roman" panose="02020603050405020304" pitchFamily="18" charset="0"/>
+                <a:cs typeface="Times New Roman" panose="02020603050405020304" pitchFamily="18" charset="0"/>
+              </a:rPr>
+              <a:t>Hybrid Complementarity</a:t>
+            </a:r>
+            <a:r>
+              <a:rPr lang="en-IN" sz="1400" dirty="0">
+                <a:latin typeface="Times New Roman" panose="02020603050405020304" pitchFamily="18" charset="0"/>
+                <a:cs typeface="Times New Roman" panose="02020603050405020304" pitchFamily="18" charset="0"/>
+              </a:rPr>
+              <a:t>:</a:t>
+            </a:r>
+          </a:p>
+          <a:p>
+            <a:pPr marL="1200150" lvl="2" indent="-285750">
+              <a:buFont typeface="+mj-lt"/>
+              <a:buAutoNum type="arabicPeriod"/>
+            </a:pPr>
+            <a:r>
+              <a:rPr lang="en-IN" sz="1400" dirty="0">
+                <a:latin typeface="Times New Roman" panose="02020603050405020304" pitchFamily="18" charset="0"/>
+                <a:cs typeface="Times New Roman" panose="02020603050405020304" pitchFamily="18" charset="0"/>
+              </a:rPr>
+              <a:t>Semantic (vector) captures meaning</a:t>
+            </a:r>
+          </a:p>
+          <a:p>
+            <a:pPr marL="1200150" lvl="2" indent="-285750">
+              <a:buFont typeface="+mj-lt"/>
+              <a:buAutoNum type="arabicPeriod"/>
+            </a:pPr>
+            <a:r>
+              <a:rPr lang="en-IN" sz="1400" dirty="0">
+                <a:latin typeface="Times New Roman" panose="02020603050405020304" pitchFamily="18" charset="0"/>
+                <a:cs typeface="Times New Roman" panose="02020603050405020304" pitchFamily="18" charset="0"/>
+              </a:rPr>
+              <a:t>BM25 captures exact terminology matches</a:t>
+            </a:r>
+          </a:p>
+          <a:p>
+            <a:pPr marL="1200150" lvl="2" indent="-285750">
+              <a:buFont typeface="+mj-lt"/>
+              <a:buAutoNum type="arabicPeriod"/>
+            </a:pPr>
+            <a:r>
+              <a:rPr lang="en-IN" sz="1400" dirty="0">
+                <a:latin typeface="Times New Roman" panose="02020603050405020304" pitchFamily="18" charset="0"/>
+                <a:cs typeface="Times New Roman" panose="02020603050405020304" pitchFamily="18" charset="0"/>
+              </a:rPr>
+              <a:t>Combined: "liability" + semantic meaning → strong recall</a:t>
+            </a:r>
+          </a:p>
+        </p:txBody>
+      </p:sp>
+      <p:sp>
+        <p:nvSpPr>
+          <p:cNvPr id="7" name="TextBox 6">
+            <a:extLst>
+              <a:ext uri="{FF2B5EF4-FFF2-40B4-BE49-F238E27FC236}">
+                <a16:creationId xmlns:a16="http://schemas.microsoft.com/office/drawing/2014/main" id="{32C000B9-00EF-DE73-1E73-D48501A311C6}"/>
+              </a:ext>
+            </a:extLst>
+          </p:cNvPr>
+          <p:cNvSpPr txBox="1"/>
+          <p:nvPr/>
+        </p:nvSpPr>
+        <p:spPr>
+          <a:xfrm>
+            <a:off x="6834432" y="1427033"/>
+            <a:ext cx="5009211" cy="2677656"/>
+          </a:xfrm>
+          <a:prstGeom prst="rect">
+            <a:avLst/>
+          </a:prstGeom>
+          <a:noFill/>
+        </p:spPr>
+        <p:txBody>
+          <a:bodyPr wrap="square">
+            <a:spAutoFit/>
+          </a:bodyPr>
+          <a:lstStyle/>
+          <a:p>
+            <a:pPr>
+              <a:buNone/>
+            </a:pPr>
+            <a:r>
+              <a:rPr lang="en-IN" sz="1400" b="1" dirty="0">
+                <a:latin typeface="Times New Roman" panose="02020603050405020304" pitchFamily="18" charset="0"/>
+                <a:cs typeface="Times New Roman" panose="02020603050405020304" pitchFamily="18" charset="0"/>
+              </a:rPr>
+              <a:t>Alternative Considered: OpenAI Embeddings (text-embedding-3-small)</a:t>
+            </a:r>
+          </a:p>
+          <a:p>
+            <a:pPr marL="171450" indent="-171450">
+              <a:buFont typeface="Arial" panose="020B0604020202020204" pitchFamily="34" charset="0"/>
+              <a:buChar char="•"/>
+            </a:pPr>
+            <a:r>
+              <a:rPr lang="en-IN" sz="1400" b="1" dirty="0">
+                <a:latin typeface="Times New Roman" panose="02020603050405020304" pitchFamily="18" charset="0"/>
+                <a:cs typeface="Times New Roman" panose="02020603050405020304" pitchFamily="18" charset="0"/>
+              </a:rPr>
+              <a:t>Pros</a:t>
+            </a:r>
+            <a:r>
+              <a:rPr lang="en-IN" sz="1400" dirty="0">
+                <a:latin typeface="Times New Roman" panose="02020603050405020304" pitchFamily="18" charset="0"/>
+                <a:cs typeface="Times New Roman" panose="02020603050405020304" pitchFamily="18" charset="0"/>
+              </a:rPr>
+              <a:t>: State-of-the-art, 1536-dim, legal domain coverage</a:t>
+            </a:r>
+          </a:p>
+          <a:p>
+            <a:pPr marL="171450" indent="-171450">
+              <a:buFont typeface="Arial" panose="020B0604020202020204" pitchFamily="34" charset="0"/>
+              <a:buChar char="•"/>
+            </a:pPr>
+            <a:r>
+              <a:rPr lang="en-IN" sz="1400" b="1" dirty="0">
+                <a:latin typeface="Times New Roman" panose="02020603050405020304" pitchFamily="18" charset="0"/>
+                <a:cs typeface="Times New Roman" panose="02020603050405020304" pitchFamily="18" charset="0"/>
+              </a:rPr>
+              <a:t>Cons</a:t>
+            </a:r>
+            <a:r>
+              <a:rPr lang="en-IN" sz="1400" dirty="0">
+                <a:latin typeface="Times New Roman" panose="02020603050405020304" pitchFamily="18" charset="0"/>
+                <a:cs typeface="Times New Roman" panose="02020603050405020304" pitchFamily="18" charset="0"/>
+              </a:rPr>
+              <a:t>: API cost, latency, no offline fallback</a:t>
+            </a:r>
+          </a:p>
+          <a:p>
+            <a:pPr marL="171450" indent="-171450">
+              <a:buFont typeface="Arial" panose="020B0604020202020204" pitchFamily="34" charset="0"/>
+              <a:buChar char="•"/>
+            </a:pPr>
+            <a:r>
+              <a:rPr lang="en-IN" sz="1400" b="1" dirty="0">
+                <a:latin typeface="Times New Roman" panose="02020603050405020304" pitchFamily="18" charset="0"/>
+                <a:cs typeface="Times New Roman" panose="02020603050405020304" pitchFamily="18" charset="0"/>
+              </a:rPr>
+              <a:t>Decision</a:t>
+            </a:r>
+            <a:r>
+              <a:rPr lang="en-IN" sz="1400" dirty="0">
+                <a:latin typeface="Times New Roman" panose="02020603050405020304" pitchFamily="18" charset="0"/>
+                <a:cs typeface="Times New Roman" panose="02020603050405020304" pitchFamily="18" charset="0"/>
+              </a:rPr>
+              <a:t>: Not for prototype; local model preferred for </a:t>
+            </a:r>
+            <a:r>
+              <a:rPr lang="en-IN" sz="1400" dirty="0" err="1">
+                <a:latin typeface="Times New Roman" panose="02020603050405020304" pitchFamily="18" charset="0"/>
+                <a:cs typeface="Times New Roman" panose="02020603050405020304" pitchFamily="18" charset="0"/>
+              </a:rPr>
+              <a:t>deployability</a:t>
+            </a:r>
+            <a:endParaRPr lang="en-IN" sz="1400" dirty="0">
+              <a:latin typeface="Times New Roman" panose="02020603050405020304" pitchFamily="18" charset="0"/>
+              <a:cs typeface="Times New Roman" panose="02020603050405020304" pitchFamily="18" charset="0"/>
+            </a:endParaRPr>
+          </a:p>
+          <a:p>
+            <a:pPr>
+              <a:buNone/>
+            </a:pPr>
+            <a:r>
+              <a:rPr lang="en-IN" sz="1400" b="1" dirty="0">
+                <a:latin typeface="Times New Roman" panose="02020603050405020304" pitchFamily="18" charset="0"/>
+                <a:cs typeface="Times New Roman" panose="02020603050405020304" pitchFamily="18" charset="0"/>
+              </a:rPr>
+              <a:t>Alternative Considered: Dense Passage Retrieval (DPR)</a:t>
+            </a:r>
+          </a:p>
+          <a:p>
+            <a:pPr marL="171450" indent="-171450">
+              <a:buFont typeface="Arial" panose="020B0604020202020204" pitchFamily="34" charset="0"/>
+              <a:buChar char="•"/>
+            </a:pPr>
+            <a:r>
+              <a:rPr lang="en-IN" sz="1400" b="1" dirty="0">
+                <a:latin typeface="Times New Roman" panose="02020603050405020304" pitchFamily="18" charset="0"/>
+                <a:cs typeface="Times New Roman" panose="02020603050405020304" pitchFamily="18" charset="0"/>
+              </a:rPr>
+              <a:t>Pros</a:t>
+            </a:r>
+            <a:r>
+              <a:rPr lang="en-IN" sz="1400" dirty="0">
+                <a:latin typeface="Times New Roman" panose="02020603050405020304" pitchFamily="18" charset="0"/>
+                <a:cs typeface="Times New Roman" panose="02020603050405020304" pitchFamily="18" charset="0"/>
+              </a:rPr>
+              <a:t>: Jointly trained retriever &amp; reader, strong legal domain potential</a:t>
+            </a:r>
+          </a:p>
+          <a:p>
+            <a:pPr marL="171450" indent="-171450">
+              <a:buFont typeface="Arial" panose="020B0604020202020204" pitchFamily="34" charset="0"/>
+              <a:buChar char="•"/>
+            </a:pPr>
+            <a:r>
+              <a:rPr lang="en-IN" sz="1400" b="1" dirty="0">
+                <a:latin typeface="Times New Roman" panose="02020603050405020304" pitchFamily="18" charset="0"/>
+                <a:cs typeface="Times New Roman" panose="02020603050405020304" pitchFamily="18" charset="0"/>
+              </a:rPr>
+              <a:t>Cons</a:t>
+            </a:r>
+            <a:r>
+              <a:rPr lang="en-IN" sz="1400" dirty="0">
+                <a:latin typeface="Times New Roman" panose="02020603050405020304" pitchFamily="18" charset="0"/>
+                <a:cs typeface="Times New Roman" panose="02020603050405020304" pitchFamily="18" charset="0"/>
+              </a:rPr>
+              <a:t>: Larger model (300M+), requires GPU, training overhead</a:t>
+            </a:r>
+          </a:p>
+          <a:p>
+            <a:pPr marL="171450" indent="-171450">
+              <a:buFont typeface="Arial" panose="020B0604020202020204" pitchFamily="34" charset="0"/>
+              <a:buChar char="•"/>
+            </a:pPr>
+            <a:r>
+              <a:rPr lang="en-IN" sz="1400" b="1" dirty="0">
+                <a:latin typeface="Times New Roman" panose="02020603050405020304" pitchFamily="18" charset="0"/>
+                <a:cs typeface="Times New Roman" panose="02020603050405020304" pitchFamily="18" charset="0"/>
+              </a:rPr>
+              <a:t>Decision</a:t>
+            </a:r>
+            <a:r>
+              <a:rPr lang="en-IN" sz="1400" dirty="0">
+                <a:latin typeface="Times New Roman" panose="02020603050405020304" pitchFamily="18" charset="0"/>
+                <a:cs typeface="Times New Roman" panose="02020603050405020304" pitchFamily="18" charset="0"/>
+              </a:rPr>
+              <a:t>: Overkill for 4-document prototype; all-</a:t>
+            </a:r>
+            <a:r>
+              <a:rPr lang="en-IN" sz="1400" dirty="0" err="1">
+                <a:latin typeface="Times New Roman" panose="02020603050405020304" pitchFamily="18" charset="0"/>
+                <a:cs typeface="Times New Roman" panose="02020603050405020304" pitchFamily="18" charset="0"/>
+              </a:rPr>
+              <a:t>MiniLM</a:t>
+            </a:r>
+            <a:r>
+              <a:rPr lang="en-IN" sz="1400" dirty="0">
+                <a:latin typeface="Times New Roman" panose="02020603050405020304" pitchFamily="18" charset="0"/>
+                <a:cs typeface="Times New Roman" panose="02020603050405020304" pitchFamily="18" charset="0"/>
+              </a:rPr>
+              <a:t> sufficient</a:t>
+            </a:r>
+          </a:p>
+        </p:txBody>
+      </p:sp>
+    </p:spTree>
+    <p:extLst>
+      <p:ext uri="{BB962C8B-B14F-4D97-AF65-F5344CB8AC3E}">
+        <p14:creationId xmlns:p14="http://schemas.microsoft.com/office/powerpoint/2010/main" val="2882015641"/>
+      </p:ext>
+    </p:extLst>
+  </p:cSld>
+  <p:clrMapOvr>
+    <a:masterClrMapping/>
+  </p:clrMapOvr>
+</p:sld>
+</file>
+
 <file path=ppt/theme/theme1.xml><?xml version="1.0" encoding="utf-8"?>
 <a:theme xmlns:a="http://schemas.openxmlformats.org/drawingml/2006/main" name="Crop">
   <a:themeElements>

</xml_diff>